<commit_message>
model size at maturity
</commit_message>
<xml_diff>
--- a/docs/Littorina_offspring_size_issue_20200409.pptx
+++ b/docs/Littorina_offspring_size_issue_20200409.pptx
@@ -6,8 +6,11 @@
   </p:sldMasterIdLst>
   <p:sldIdLst>
     <p:sldId id="256" r:id="rId2"/>
-    <p:sldId id="257" r:id="rId3"/>
-    <p:sldId id="258" r:id="rId4"/>
+    <p:sldId id="259" r:id="rId3"/>
+    <p:sldId id="260" r:id="rId4"/>
+    <p:sldId id="257" r:id="rId5"/>
+    <p:sldId id="261" r:id="rId6"/>
+    <p:sldId id="258" r:id="rId7"/>
   </p:sldIdLst>
   <p:sldSz cx="12192000" cy="6858000"/>
   <p:notesSz cx="6858000" cy="9144000"/>
@@ -263,7 +266,7 @@
           <a:p>
             <a:fld id="{D227D55A-97F2-1B47-A7B8-7DB12749D7A6}" type="datetimeFigureOut">
               <a:rPr lang="en-GB" smtClean="0"/>
-              <a:t>09/04/2020</a:t>
+              <a:t>17/04/2020</a:t>
             </a:fld>
             <a:endParaRPr lang="en-GB"/>
           </a:p>
@@ -463,7 +466,7 @@
           <a:p>
             <a:fld id="{D227D55A-97F2-1B47-A7B8-7DB12749D7A6}" type="datetimeFigureOut">
               <a:rPr lang="en-GB" smtClean="0"/>
-              <a:t>09/04/2020</a:t>
+              <a:t>17/04/2020</a:t>
             </a:fld>
             <a:endParaRPr lang="en-GB"/>
           </a:p>
@@ -673,7 +676,7 @@
           <a:p>
             <a:fld id="{D227D55A-97F2-1B47-A7B8-7DB12749D7A6}" type="datetimeFigureOut">
               <a:rPr lang="en-GB" smtClean="0"/>
-              <a:t>09/04/2020</a:t>
+              <a:t>17/04/2020</a:t>
             </a:fld>
             <a:endParaRPr lang="en-GB"/>
           </a:p>
@@ -873,7 +876,7 @@
           <a:p>
             <a:fld id="{D227D55A-97F2-1B47-A7B8-7DB12749D7A6}" type="datetimeFigureOut">
               <a:rPr lang="en-GB" smtClean="0"/>
-              <a:t>09/04/2020</a:t>
+              <a:t>17/04/2020</a:t>
             </a:fld>
             <a:endParaRPr lang="en-GB"/>
           </a:p>
@@ -1149,7 +1152,7 @@
           <a:p>
             <a:fld id="{D227D55A-97F2-1B47-A7B8-7DB12749D7A6}" type="datetimeFigureOut">
               <a:rPr lang="en-GB" smtClean="0"/>
-              <a:t>09/04/2020</a:t>
+              <a:t>17/04/2020</a:t>
             </a:fld>
             <a:endParaRPr lang="en-GB"/>
           </a:p>
@@ -1417,7 +1420,7 @@
           <a:p>
             <a:fld id="{D227D55A-97F2-1B47-A7B8-7DB12749D7A6}" type="datetimeFigureOut">
               <a:rPr lang="en-GB" smtClean="0"/>
-              <a:t>09/04/2020</a:t>
+              <a:t>17/04/2020</a:t>
             </a:fld>
             <a:endParaRPr lang="en-GB"/>
           </a:p>
@@ -1832,7 +1835,7 @@
           <a:p>
             <a:fld id="{D227D55A-97F2-1B47-A7B8-7DB12749D7A6}" type="datetimeFigureOut">
               <a:rPr lang="en-GB" smtClean="0"/>
-              <a:t>09/04/2020</a:t>
+              <a:t>17/04/2020</a:t>
             </a:fld>
             <a:endParaRPr lang="en-GB"/>
           </a:p>
@@ -1974,7 +1977,7 @@
           <a:p>
             <a:fld id="{D227D55A-97F2-1B47-A7B8-7DB12749D7A6}" type="datetimeFigureOut">
               <a:rPr lang="en-GB" smtClean="0"/>
-              <a:t>09/04/2020</a:t>
+              <a:t>17/04/2020</a:t>
             </a:fld>
             <a:endParaRPr lang="en-GB"/>
           </a:p>
@@ -2087,7 +2090,7 @@
           <a:p>
             <a:fld id="{D227D55A-97F2-1B47-A7B8-7DB12749D7A6}" type="datetimeFigureOut">
               <a:rPr lang="en-GB" smtClean="0"/>
-              <a:t>09/04/2020</a:t>
+              <a:t>17/04/2020</a:t>
             </a:fld>
             <a:endParaRPr lang="en-GB"/>
           </a:p>
@@ -2400,7 +2403,7 @@
           <a:p>
             <a:fld id="{D227D55A-97F2-1B47-A7B8-7DB12749D7A6}" type="datetimeFigureOut">
               <a:rPr lang="en-GB" smtClean="0"/>
-              <a:t>09/04/2020</a:t>
+              <a:t>17/04/2020</a:t>
             </a:fld>
             <a:endParaRPr lang="en-GB"/>
           </a:p>
@@ -2689,7 +2692,7 @@
           <a:p>
             <a:fld id="{D227D55A-97F2-1B47-A7B8-7DB12749D7A6}" type="datetimeFigureOut">
               <a:rPr lang="en-GB" smtClean="0"/>
-              <a:t>09/04/2020</a:t>
+              <a:t>17/04/2020</a:t>
             </a:fld>
             <a:endParaRPr lang="en-GB"/>
           </a:p>
@@ -2932,7 +2935,7 @@
           <a:p>
             <a:fld id="{D227D55A-97F2-1B47-A7B8-7DB12749D7A6}" type="datetimeFigureOut">
               <a:rPr lang="en-GB" smtClean="0"/>
-              <a:t>09/04/2020</a:t>
+              <a:t>17/04/2020</a:t>
             </a:fld>
             <a:endParaRPr lang="en-GB"/>
           </a:p>
@@ -3363,16 +3366,15 @@
           </p:cNvPicPr>
           <p:nvPr/>
         </p:nvPicPr>
-        <p:blipFill>
+        <p:blipFill rotWithShape="1">
           <a:blip r:embed="rId2"/>
-          <a:stretch>
-            <a:fillRect/>
-          </a:stretch>
+          <a:srcRect t="2345" b="858"/>
+          <a:stretch/>
         </p:blipFill>
         <p:spPr bwMode="auto">
           <a:xfrm>
-            <a:off x="0" y="0"/>
-            <a:ext cx="3960000" cy="3960000"/>
+            <a:off x="0" y="1052946"/>
+            <a:ext cx="5210007" cy="5043053"/>
           </a:xfrm>
           <a:prstGeom prst="rect">
             <a:avLst/>
@@ -3385,12 +3387,69 @@
           </a:ln>
         </p:spPr>
       </p:pic>
+      <p:sp>
+        <p:nvSpPr>
+          <p:cNvPr id="8" name="Rectangle 7">
+            <a:extLst>
+              <a:ext uri="{FF2B5EF4-FFF2-40B4-BE49-F238E27FC236}">
+                <a16:creationId xmlns:a16="http://schemas.microsoft.com/office/drawing/2014/main" id="{18ECC612-60C6-644E-A3A0-CE9C8DD71896}"/>
+              </a:ext>
+            </a:extLst>
+          </p:cNvPr>
+          <p:cNvSpPr/>
+          <p:nvPr/>
+        </p:nvSpPr>
+        <p:spPr>
+          <a:xfrm>
+            <a:off x="3703537" y="471310"/>
+            <a:ext cx="4784926" cy="400110"/>
+          </a:xfrm>
+          <a:prstGeom prst="rect">
+            <a:avLst/>
+          </a:prstGeom>
+        </p:spPr>
+        <p:txBody>
+          <a:bodyPr wrap="square">
+            <a:spAutoFit/>
+          </a:bodyPr>
+          <a:lstStyle/>
+          <a:p>
+            <a:pPr>
+              <a:spcBef>
+                <a:spcPts val="800"/>
+              </a:spcBef>
+              <a:spcAft>
+                <a:spcPts val="0"/>
+              </a:spcAft>
+            </a:pPr>
+            <a:r>
+              <a:rPr lang="en-US" sz="2000" dirty="0">
+                <a:solidFill>
+                  <a:srgbClr val="000000"/>
+                </a:solidFill>
+                <a:latin typeface="Cambria" panose="02040503050406030204" pitchFamily="18" charset="0"/>
+                <a:ea typeface="Arial Unicode MS" panose="020B0604020202020204" pitchFamily="34" charset="-128"/>
+                <a:cs typeface="Arial Unicode MS" panose="020B0604020202020204" pitchFamily="34" charset="-128"/>
+              </a:rPr>
+              <a:t>bold and PC2 seem to be size-independent</a:t>
+            </a:r>
+            <a:endParaRPr lang="en-US" sz="2000" dirty="0">
+              <a:solidFill>
+                <a:srgbClr val="000000"/>
+              </a:solidFill>
+              <a:latin typeface="Helvetica Neue" panose="02000503000000020004" pitchFamily="2" charset="0"/>
+              <a:ea typeface="Arial Unicode MS" panose="020B0604020202020204" pitchFamily="34" charset="-128"/>
+              <a:cs typeface="Arial Unicode MS" panose="020B0604020202020204" pitchFamily="34" charset="-128"/>
+            </a:endParaRPr>
+          </a:p>
+        </p:txBody>
+      </p:sp>
       <p:pic>
         <p:nvPicPr>
-          <p:cNvPr id="3" name="Picture" descr="Figure tmp1. Scatter plots of the relationship between size and the other phenotypes per population in each generation separately. Phenotypic values have not been scaled.">
+          <p:cNvPr id="9" name="Picture" descr="Figure tmp1. Scatter plots of the relationship between size and the other phenotypes per population in each generation separately. Phenotypic values have not been scaled.">
             <a:extLst>
               <a:ext uri="{FF2B5EF4-FFF2-40B4-BE49-F238E27FC236}">
-                <a16:creationId xmlns:a16="http://schemas.microsoft.com/office/drawing/2014/main" id="{7E2BA4A6-E6AE-4742-9218-D38F4AF541C2}"/>
+                <a16:creationId xmlns:a16="http://schemas.microsoft.com/office/drawing/2014/main" id="{4A19802E-603F-B24D-A17B-C9313975D68C}"/>
               </a:ext>
             </a:extLst>
           </p:cNvPr>
@@ -3399,88 +3458,15 @@
           </p:cNvPicPr>
           <p:nvPr/>
         </p:nvPicPr>
-        <p:blipFill>
+        <p:blipFill rotWithShape="1">
           <a:blip r:embed="rId3"/>
-          <a:stretch>
-            <a:fillRect/>
-          </a:stretch>
+          <a:srcRect t="12185"/>
+          <a:stretch/>
         </p:blipFill>
         <p:spPr bwMode="auto">
           <a:xfrm>
-            <a:off x="4066936" y="0"/>
-            <a:ext cx="3960000" cy="3960000"/>
-          </a:xfrm>
-          <a:prstGeom prst="rect">
-            <a:avLst/>
-          </a:prstGeom>
-          <a:noFill/>
-          <a:ln w="9525">
-            <a:noFill/>
-            <a:headEnd/>
-            <a:tailEnd/>
-          </a:ln>
-        </p:spPr>
-      </p:pic>
-      <p:pic>
-        <p:nvPicPr>
-          <p:cNvPr id="4" name="Picture" descr="Figure tmp1. Scatter plots of the relationship between size and the other phenotypes per population in each generation separately. Phenotypic values have not been scaled.">
-            <a:extLst>
-              <a:ext uri="{FF2B5EF4-FFF2-40B4-BE49-F238E27FC236}">
-                <a16:creationId xmlns:a16="http://schemas.microsoft.com/office/drawing/2014/main" id="{E4B61AE4-D489-F24B-A52E-8048F8B71996}"/>
-              </a:ext>
-            </a:extLst>
-          </p:cNvPr>
-          <p:cNvPicPr>
-            <a:picLocks noChangeAspect="1"/>
-          </p:cNvPicPr>
-          <p:nvPr/>
-        </p:nvPicPr>
-        <p:blipFill>
-          <a:blip r:embed="rId4"/>
-          <a:stretch>
-            <a:fillRect/>
-          </a:stretch>
-        </p:blipFill>
-        <p:spPr bwMode="auto">
-          <a:xfrm>
-            <a:off x="8133872" y="0"/>
-            <a:ext cx="3960000" cy="3960000"/>
-          </a:xfrm>
-          <a:prstGeom prst="rect">
-            <a:avLst/>
-          </a:prstGeom>
-          <a:noFill/>
-          <a:ln w="9525">
-            <a:noFill/>
-            <a:headEnd/>
-            <a:tailEnd/>
-          </a:ln>
-        </p:spPr>
-      </p:pic>
-      <p:pic>
-        <p:nvPicPr>
-          <p:cNvPr id="5" name="Picture" descr="Figure tmp1. Scatter plots of the relationship between size and the other phenotypes per population in each generation separately. Phenotypic values have not been scaled.">
-            <a:extLst>
-              <a:ext uri="{FF2B5EF4-FFF2-40B4-BE49-F238E27FC236}">
-                <a16:creationId xmlns:a16="http://schemas.microsoft.com/office/drawing/2014/main" id="{BF923CB0-C57E-9543-A62D-3BEE758D6333}"/>
-              </a:ext>
-            </a:extLst>
-          </p:cNvPr>
-          <p:cNvPicPr>
-            <a:picLocks noChangeAspect="1"/>
-          </p:cNvPicPr>
-          <p:nvPr/>
-        </p:nvPicPr>
-        <p:blipFill>
-          <a:blip r:embed="rId5"/>
-          <a:stretch>
-            <a:fillRect/>
-          </a:stretch>
-        </p:blipFill>
-        <p:spPr bwMode="auto">
-          <a:xfrm>
-            <a:off x="0" y="3960000"/>
-            <a:ext cx="3960000" cy="3960000"/>
+            <a:off x="5210007" y="1415999"/>
+            <a:ext cx="5329360" cy="4680000"/>
           </a:xfrm>
           <a:prstGeom prst="rect">
             <a:avLst/>
@@ -3507,15 +3493,15 @@
         </p:nvSpPr>
         <p:spPr>
           <a:xfrm>
-            <a:off x="4322618" y="4352789"/>
-            <a:ext cx="6096000" cy="923330"/>
+            <a:off x="249730" y="6097202"/>
+            <a:ext cx="10289637" cy="584775"/>
           </a:xfrm>
           <a:prstGeom prst="rect">
             <a:avLst/>
           </a:prstGeom>
         </p:spPr>
         <p:txBody>
-          <a:bodyPr>
+          <a:bodyPr wrap="square">
             <a:spAutoFit/>
           </a:bodyPr>
           <a:lstStyle/>
@@ -3526,7 +3512,7 @@
               </a:spcAft>
             </a:pPr>
             <a:r>
-              <a:rPr lang="en-US" i="1" dirty="0">
+              <a:rPr lang="en-US" sz="1600" i="1" dirty="0">
                 <a:latin typeface="Cambria" panose="02040503050406030204" pitchFamily="18" charset="0"/>
                 <a:ea typeface="Cambria" panose="02040503050406030204" pitchFamily="18" charset="0"/>
                 <a:cs typeface="Times New Roman" panose="02020603050405020304" pitchFamily="18" charset="0"/>
@@ -3566,6 +3552,349 @@
           <a:chExt cx="0" cy="0"/>
         </a:xfrm>
       </p:grpSpPr>
+      <p:pic>
+        <p:nvPicPr>
+          <p:cNvPr id="3" name="Picture" descr="Figure tmp1. Scatter plots of the relationship between size and the other phenotypes per population in each generation separately. Phenotypic values have not been scaled.">
+            <a:extLst>
+              <a:ext uri="{FF2B5EF4-FFF2-40B4-BE49-F238E27FC236}">
+                <a16:creationId xmlns:a16="http://schemas.microsoft.com/office/drawing/2014/main" id="{7E2BA4A6-E6AE-4742-9218-D38F4AF541C2}"/>
+              </a:ext>
+            </a:extLst>
+          </p:cNvPr>
+          <p:cNvPicPr>
+            <a:picLocks noChangeAspect="1"/>
+          </p:cNvPicPr>
+          <p:nvPr/>
+        </p:nvPicPr>
+        <p:blipFill>
+          <a:blip r:embed="rId2"/>
+          <a:stretch>
+            <a:fillRect/>
+          </a:stretch>
+        </p:blipFill>
+        <p:spPr bwMode="auto">
+          <a:xfrm>
+            <a:off x="132245" y="0"/>
+            <a:ext cx="4680000" cy="4680000"/>
+          </a:xfrm>
+          <a:prstGeom prst="rect">
+            <a:avLst/>
+          </a:prstGeom>
+          <a:noFill/>
+          <a:ln w="9525">
+            <a:noFill/>
+            <a:headEnd/>
+            <a:tailEnd/>
+          </a:ln>
+        </p:spPr>
+      </p:pic>
+      <p:sp>
+        <p:nvSpPr>
+          <p:cNvPr id="6" name="Rectangle 5">
+            <a:extLst>
+              <a:ext uri="{FF2B5EF4-FFF2-40B4-BE49-F238E27FC236}">
+                <a16:creationId xmlns:a16="http://schemas.microsoft.com/office/drawing/2014/main" id="{E4F94E41-7CB3-004A-97BD-06E275ED4E69}"/>
+              </a:ext>
+            </a:extLst>
+          </p:cNvPr>
+          <p:cNvSpPr/>
+          <p:nvPr/>
+        </p:nvSpPr>
+        <p:spPr>
+          <a:xfrm>
+            <a:off x="132245" y="4680000"/>
+            <a:ext cx="8554555" cy="584775"/>
+          </a:xfrm>
+          <a:prstGeom prst="rect">
+            <a:avLst/>
+          </a:prstGeom>
+        </p:spPr>
+        <p:txBody>
+          <a:bodyPr wrap="square">
+            <a:spAutoFit/>
+          </a:bodyPr>
+          <a:lstStyle/>
+          <a:p>
+            <a:pPr>
+              <a:spcAft>
+                <a:spcPts val="600"/>
+              </a:spcAft>
+            </a:pPr>
+            <a:r>
+              <a:rPr lang="en-US" sz="1600" i="1" dirty="0">
+                <a:latin typeface="Cambria" panose="02040503050406030204" pitchFamily="18" charset="0"/>
+                <a:ea typeface="Cambria" panose="02040503050406030204" pitchFamily="18" charset="0"/>
+                <a:cs typeface="Times New Roman" panose="02020603050405020304" pitchFamily="18" charset="0"/>
+              </a:rPr>
+              <a:t>Figure 1. Scatter plots of the relationship between size and the other phenotypes per population in each generation separately. Phenotypic values have not been scaled.</a:t>
+            </a:r>
+          </a:p>
+        </p:txBody>
+      </p:sp>
+      <p:sp>
+        <p:nvSpPr>
+          <p:cNvPr id="8" name="Rectangle 7">
+            <a:extLst>
+              <a:ext uri="{FF2B5EF4-FFF2-40B4-BE49-F238E27FC236}">
+                <a16:creationId xmlns:a16="http://schemas.microsoft.com/office/drawing/2014/main" id="{18ECC612-60C6-644E-A3A0-CE9C8DD71896}"/>
+              </a:ext>
+            </a:extLst>
+          </p:cNvPr>
+          <p:cNvSpPr/>
+          <p:nvPr/>
+        </p:nvSpPr>
+        <p:spPr>
+          <a:xfrm>
+            <a:off x="5009045" y="547525"/>
+            <a:ext cx="6096000" cy="1200329"/>
+          </a:xfrm>
+          <a:prstGeom prst="rect">
+            <a:avLst/>
+          </a:prstGeom>
+        </p:spPr>
+        <p:txBody>
+          <a:bodyPr>
+            <a:spAutoFit/>
+          </a:bodyPr>
+          <a:lstStyle/>
+          <a:p>
+            <a:pPr>
+              <a:spcBef>
+                <a:spcPts val="800"/>
+              </a:spcBef>
+              <a:spcAft>
+                <a:spcPts val="0"/>
+              </a:spcAft>
+            </a:pPr>
+            <a:r>
+              <a:rPr lang="en-US" dirty="0">
+                <a:solidFill>
+                  <a:srgbClr val="000000"/>
+                </a:solidFill>
+                <a:latin typeface="Cambria" panose="02040503050406030204" pitchFamily="18" charset="0"/>
+                <a:ea typeface="Arial Unicode MS" panose="020B0604020202020204" pitchFamily="34" charset="-128"/>
+                <a:cs typeface="Arial Unicode MS" panose="020B0604020202020204" pitchFamily="34" charset="-128"/>
+              </a:rPr>
+              <a:t>thickness is clearly size-dependent. There is some scatter, which might mean that there is some interesting size-independent thickness variation but it might also just mean that the thickness measurements are noisy! </a:t>
+            </a:r>
+            <a:endParaRPr lang="en-US" dirty="0">
+              <a:solidFill>
+                <a:srgbClr val="000000"/>
+              </a:solidFill>
+              <a:latin typeface="Helvetica Neue" panose="02000503000000020004" pitchFamily="2" charset="0"/>
+              <a:ea typeface="Arial Unicode MS" panose="020B0604020202020204" pitchFamily="34" charset="-128"/>
+              <a:cs typeface="Arial Unicode MS" panose="020B0604020202020204" pitchFamily="34" charset="-128"/>
+            </a:endParaRPr>
+          </a:p>
+        </p:txBody>
+      </p:sp>
+    </p:spTree>
+    <p:extLst>
+      <p:ext uri="{BB962C8B-B14F-4D97-AF65-F5344CB8AC3E}">
+        <p14:creationId xmlns:p14="http://schemas.microsoft.com/office/powerpoint/2010/main" val="4266066783"/>
+      </p:ext>
+    </p:extLst>
+  </p:cSld>
+  <p:clrMapOvr>
+    <a:masterClrMapping/>
+  </p:clrMapOvr>
+</p:sld>
+</file>
+
+<file path=ppt/slides/slide3.xml><?xml version="1.0" encoding="utf-8"?>
+<p:sld xmlns:a="http://schemas.openxmlformats.org/drawingml/2006/main" xmlns:r="http://schemas.openxmlformats.org/officeDocument/2006/relationships" xmlns:p="http://schemas.openxmlformats.org/presentationml/2006/main">
+  <p:cSld>
+    <p:spTree>
+      <p:nvGrpSpPr>
+        <p:cNvPr id="1" name=""/>
+        <p:cNvGrpSpPr/>
+        <p:nvPr/>
+      </p:nvGrpSpPr>
+      <p:grpSpPr>
+        <a:xfrm>
+          <a:off x="0" y="0"/>
+          <a:ext cx="0" cy="0"/>
+          <a:chOff x="0" y="0"/>
+          <a:chExt cx="0" cy="0"/>
+        </a:xfrm>
+      </p:grpSpPr>
+      <p:pic>
+        <p:nvPicPr>
+          <p:cNvPr id="4" name="Picture" descr="Figure tmp1. Scatter plots of the relationship between size and the other phenotypes per population in each generation separately. Phenotypic values have not been scaled.">
+            <a:extLst>
+              <a:ext uri="{FF2B5EF4-FFF2-40B4-BE49-F238E27FC236}">
+                <a16:creationId xmlns:a16="http://schemas.microsoft.com/office/drawing/2014/main" id="{E4B61AE4-D489-F24B-A52E-8048F8B71996}"/>
+              </a:ext>
+            </a:extLst>
+          </p:cNvPr>
+          <p:cNvPicPr>
+            <a:picLocks noChangeAspect="1"/>
+          </p:cNvPicPr>
+          <p:nvPr/>
+        </p:nvPicPr>
+        <p:blipFill>
+          <a:blip r:embed="rId2"/>
+          <a:stretch>
+            <a:fillRect/>
+          </a:stretch>
+        </p:blipFill>
+        <p:spPr bwMode="auto">
+          <a:xfrm>
+            <a:off x="486162" y="461665"/>
+            <a:ext cx="5040000" cy="5040000"/>
+          </a:xfrm>
+          <a:prstGeom prst="rect">
+            <a:avLst/>
+          </a:prstGeom>
+          <a:noFill/>
+          <a:ln w="9525">
+            <a:noFill/>
+            <a:headEnd/>
+            <a:tailEnd/>
+          </a:ln>
+        </p:spPr>
+      </p:pic>
+      <p:sp>
+        <p:nvSpPr>
+          <p:cNvPr id="6" name="Rectangle 5">
+            <a:extLst>
+              <a:ext uri="{FF2B5EF4-FFF2-40B4-BE49-F238E27FC236}">
+                <a16:creationId xmlns:a16="http://schemas.microsoft.com/office/drawing/2014/main" id="{E4F94E41-7CB3-004A-97BD-06E275ED4E69}"/>
+              </a:ext>
+            </a:extLst>
+          </p:cNvPr>
+          <p:cNvSpPr/>
+          <p:nvPr/>
+        </p:nvSpPr>
+        <p:spPr>
+          <a:xfrm>
+            <a:off x="486162" y="5501665"/>
+            <a:ext cx="10015584" cy="646331"/>
+          </a:xfrm>
+          <a:prstGeom prst="rect">
+            <a:avLst/>
+          </a:prstGeom>
+        </p:spPr>
+        <p:txBody>
+          <a:bodyPr wrap="square">
+            <a:spAutoFit/>
+          </a:bodyPr>
+          <a:lstStyle/>
+          <a:p>
+            <a:pPr>
+              <a:spcAft>
+                <a:spcPts val="600"/>
+              </a:spcAft>
+            </a:pPr>
+            <a:r>
+              <a:rPr lang="en-US" i="1" dirty="0">
+                <a:latin typeface="Cambria" panose="02040503050406030204" pitchFamily="18" charset="0"/>
+                <a:ea typeface="Cambria" panose="02040503050406030204" pitchFamily="18" charset="0"/>
+                <a:cs typeface="Times New Roman" panose="02020603050405020304" pitchFamily="18" charset="0"/>
+              </a:rPr>
+              <a:t>Figure 1. Scatter plots of the relationship between size and the other phenotypes per population in each generation separately. Phenotypic values have not been scaled.</a:t>
+            </a:r>
+          </a:p>
+        </p:txBody>
+      </p:sp>
+      <p:sp>
+        <p:nvSpPr>
+          <p:cNvPr id="8" name="Rectangle 7">
+            <a:extLst>
+              <a:ext uri="{FF2B5EF4-FFF2-40B4-BE49-F238E27FC236}">
+                <a16:creationId xmlns:a16="http://schemas.microsoft.com/office/drawing/2014/main" id="{18ECC612-60C6-644E-A3A0-CE9C8DD71896}"/>
+              </a:ext>
+            </a:extLst>
+          </p:cNvPr>
+          <p:cNvSpPr/>
+          <p:nvPr/>
+        </p:nvSpPr>
+        <p:spPr>
+          <a:xfrm>
+            <a:off x="5664707" y="1019696"/>
+            <a:ext cx="6096000" cy="1200329"/>
+          </a:xfrm>
+          <a:prstGeom prst="rect">
+            <a:avLst/>
+          </a:prstGeom>
+        </p:spPr>
+        <p:txBody>
+          <a:bodyPr>
+            <a:spAutoFit/>
+          </a:bodyPr>
+          <a:lstStyle/>
+          <a:p>
+            <a:pPr>
+              <a:spcBef>
+                <a:spcPts val="800"/>
+              </a:spcBef>
+              <a:spcAft>
+                <a:spcPts val="0"/>
+              </a:spcAft>
+            </a:pPr>
+            <a:r>
+              <a:rPr lang="en-US" dirty="0" err="1">
+                <a:solidFill>
+                  <a:srgbClr val="000000"/>
+                </a:solidFill>
+                <a:latin typeface="Cambria" panose="02040503050406030204" pitchFamily="18" charset="0"/>
+                <a:ea typeface="Arial Unicode MS" panose="020B0604020202020204" pitchFamily="34" charset="-128"/>
+                <a:cs typeface="Arial Unicode MS" panose="020B0604020202020204" pitchFamily="34" charset="-128"/>
+              </a:rPr>
+              <a:t>cube_root_weight</a:t>
+            </a:r>
+            <a:r>
+              <a:rPr lang="en-US" dirty="0">
+                <a:solidFill>
+                  <a:srgbClr val="000000"/>
+                </a:solidFill>
+                <a:latin typeface="Cambria" panose="02040503050406030204" pitchFamily="18" charset="0"/>
+                <a:ea typeface="Arial Unicode MS" panose="020B0604020202020204" pitchFamily="34" charset="-128"/>
+                <a:cs typeface="Arial Unicode MS" panose="020B0604020202020204" pitchFamily="34" charset="-128"/>
+              </a:rPr>
+              <a:t> looks almost perfectly correlated with size! Also, the relationship looks linear across the whole size range and very similar in all populations. It may be that there is no size-independent variation in weight. </a:t>
+            </a:r>
+            <a:endParaRPr lang="en-US" dirty="0">
+              <a:solidFill>
+                <a:srgbClr val="000000"/>
+              </a:solidFill>
+              <a:latin typeface="Helvetica Neue" panose="02000503000000020004" pitchFamily="2" charset="0"/>
+              <a:ea typeface="Arial Unicode MS" panose="020B0604020202020204" pitchFamily="34" charset="-128"/>
+              <a:cs typeface="Arial Unicode MS" panose="020B0604020202020204" pitchFamily="34" charset="-128"/>
+            </a:endParaRPr>
+          </a:p>
+        </p:txBody>
+      </p:sp>
+    </p:spTree>
+    <p:extLst>
+      <p:ext uri="{BB962C8B-B14F-4D97-AF65-F5344CB8AC3E}">
+        <p14:creationId xmlns:p14="http://schemas.microsoft.com/office/powerpoint/2010/main" val="2384165430"/>
+      </p:ext>
+    </p:extLst>
+  </p:cSld>
+  <p:clrMapOvr>
+    <a:masterClrMapping/>
+  </p:clrMapOvr>
+</p:sld>
+</file>
+
+<file path=ppt/slides/slide4.xml><?xml version="1.0" encoding="utf-8"?>
+<p:sld xmlns:a="http://schemas.openxmlformats.org/drawingml/2006/main" xmlns:r="http://schemas.openxmlformats.org/officeDocument/2006/relationships" xmlns:p="http://schemas.openxmlformats.org/presentationml/2006/main">
+  <p:cSld>
+    <p:spTree>
+      <p:nvGrpSpPr>
+        <p:cNvPr id="1" name=""/>
+        <p:cNvGrpSpPr/>
+        <p:nvPr/>
+      </p:nvGrpSpPr>
+      <p:grpSpPr>
+        <a:xfrm>
+          <a:off x="0" y="0"/>
+          <a:ext cx="0" cy="0"/>
+          <a:chOff x="0" y="0"/>
+          <a:chExt cx="0" cy="0"/>
+        </a:xfrm>
+      </p:grpSpPr>
       <p:sp>
         <p:nvSpPr>
           <p:cNvPr id="4" name="Rectangle 3">
@@ -3580,21 +3909,21 @@
         </p:nvSpPr>
         <p:spPr>
           <a:xfrm>
-            <a:off x="3048000" y="5400000"/>
-            <a:ext cx="6096000" cy="923330"/>
+            <a:off x="171764" y="4680000"/>
+            <a:ext cx="6104345" cy="584775"/>
           </a:xfrm>
           <a:prstGeom prst="rect">
             <a:avLst/>
           </a:prstGeom>
         </p:spPr>
         <p:txBody>
-          <a:bodyPr>
+          <a:bodyPr wrap="square">
             <a:spAutoFit/>
           </a:bodyPr>
           <a:lstStyle/>
           <a:p>
             <a:r>
-              <a:rPr lang="en-US" i="1" dirty="0">
+              <a:rPr lang="en-US" sz="1600" i="1" dirty="0">
                 <a:latin typeface="Cambria" panose="02040503050406030204" pitchFamily="18" charset="0"/>
                 <a:ea typeface="Cambria" panose="02040503050406030204" pitchFamily="18" charset="0"/>
                 <a:cs typeface="Times New Roman" panose="02020603050405020304" pitchFamily="18" charset="0"/>
@@ -3602,12 +3931,12 @@
               <a:t>Figure 2. Boxplot of the scaled cube root of weight per generation and population. Phenotypic values have been scaled.</a:t>
             </a:r>
             <a:r>
-              <a:rPr lang="en-US" dirty="0">
+              <a:rPr lang="en-US" sz="1600" dirty="0">
                 <a:effectLst/>
               </a:rPr>
               <a:t> </a:t>
             </a:r>
-            <a:endParaRPr lang="en-GB" dirty="0"/>
+            <a:endParaRPr lang="en-GB" sz="1600" dirty="0"/>
           </a:p>
         </p:txBody>
       </p:sp>
@@ -3633,14 +3962,97 @@
         </p:blipFill>
         <p:spPr>
           <a:xfrm>
-            <a:off x="2721000" y="0"/>
-            <a:ext cx="6750000" cy="5400000"/>
+            <a:off x="171764" y="0"/>
+            <a:ext cx="5850000" cy="4680000"/>
           </a:xfrm>
           <a:prstGeom prst="rect">
             <a:avLst/>
           </a:prstGeom>
         </p:spPr>
       </p:pic>
+      <p:sp>
+        <p:nvSpPr>
+          <p:cNvPr id="2" name="Rectangle 1">
+            <a:extLst>
+              <a:ext uri="{FF2B5EF4-FFF2-40B4-BE49-F238E27FC236}">
+                <a16:creationId xmlns:a16="http://schemas.microsoft.com/office/drawing/2014/main" id="{B07C1E85-AFD5-7C46-9AE6-4DABCD3ED7D0}"/>
+              </a:ext>
+            </a:extLst>
+          </p:cNvPr>
+          <p:cNvSpPr/>
+          <p:nvPr/>
+        </p:nvSpPr>
+        <p:spPr>
+          <a:xfrm>
+            <a:off x="6096000" y="305248"/>
+            <a:ext cx="6096000" cy="2177519"/>
+          </a:xfrm>
+          <a:prstGeom prst="rect">
+            <a:avLst/>
+          </a:prstGeom>
+        </p:spPr>
+        <p:txBody>
+          <a:bodyPr>
+            <a:spAutoFit/>
+          </a:bodyPr>
+          <a:lstStyle/>
+          <a:p>
+            <a:pPr>
+              <a:spcBef>
+                <a:spcPts val="800"/>
+              </a:spcBef>
+              <a:spcAft>
+                <a:spcPts val="0"/>
+              </a:spcAft>
+            </a:pPr>
+            <a:r>
+              <a:rPr lang="en-US" sz="1600" dirty="0">
+                <a:solidFill>
+                  <a:srgbClr val="000000"/>
+                </a:solidFill>
+                <a:latin typeface="Cambria" panose="02040503050406030204" pitchFamily="18" charset="0"/>
+                <a:ea typeface="Arial Unicode MS" panose="020B0604020202020204" pitchFamily="34" charset="-128"/>
+                <a:cs typeface="Arial Unicode MS" panose="020B0604020202020204" pitchFamily="34" charset="-128"/>
+              </a:rPr>
+              <a:t>Gen0 is the expected pattern. Gen1 is flat. This is a bit odd.</a:t>
+            </a:r>
+            <a:endParaRPr lang="en-US" sz="1600" dirty="0">
+              <a:solidFill>
+                <a:srgbClr val="000000"/>
+              </a:solidFill>
+              <a:latin typeface="Helvetica Neue" panose="02000503000000020004" pitchFamily="2" charset="0"/>
+              <a:ea typeface="Arial Unicode MS" panose="020B0604020202020204" pitchFamily="34" charset="-128"/>
+              <a:cs typeface="Arial Unicode MS" panose="020B0604020202020204" pitchFamily="34" charset="-128"/>
+            </a:endParaRPr>
+          </a:p>
+          <a:p>
+            <a:pPr>
+              <a:spcBef>
+                <a:spcPts val="900"/>
+              </a:spcBef>
+              <a:spcAft>
+                <a:spcPts val="900"/>
+              </a:spcAft>
+            </a:pPr>
+            <a:r>
+              <a:rPr lang="en-US" sz="1600" dirty="0">
+                <a:solidFill>
+                  <a:srgbClr val="000000"/>
+                </a:solidFill>
+                <a:uFill>
+                  <a:solidFill>
+                    <a:srgbClr val="000000"/>
+                  </a:solidFill>
+                </a:uFill>
+                <a:latin typeface="Cambria" panose="02040503050406030204" pitchFamily="18" charset="0"/>
+                <a:ea typeface="Arial Unicode MS" panose="020B0604020202020204" pitchFamily="34" charset="-128"/>
+                <a:cs typeface="Arial Unicode MS" panose="020B0604020202020204" pitchFamily="34" charset="-128"/>
+              </a:rPr>
+              <a:t>There are two obvious alternative explanations (not mutually exclusive): sampling was timed for when the size reached a certain point, or size is very plastic. We might separate these effects (partly) by correcting for sampling time (although larger snails were taken at each time point, I guess). Ultimately, this sampling time issue might make it hard to say anything about plasticity for size (or weight).</a:t>
+            </a:r>
+          </a:p>
+        </p:txBody>
+      </p:sp>
     </p:spTree>
     <p:extLst>
       <p:ext uri="{BB962C8B-B14F-4D97-AF65-F5344CB8AC3E}">
@@ -3654,7 +4066,281 @@
 </p:sld>
 </file>
 
-<file path=ppt/slides/slide3.xml><?xml version="1.0" encoding="utf-8"?>
+<file path=ppt/slides/slide5.xml><?xml version="1.0" encoding="utf-8"?>
+<p:sld xmlns:a="http://schemas.openxmlformats.org/drawingml/2006/main" xmlns:r="http://schemas.openxmlformats.org/officeDocument/2006/relationships" xmlns:p="http://schemas.openxmlformats.org/presentationml/2006/main">
+  <p:cSld>
+    <p:spTree>
+      <p:nvGrpSpPr>
+        <p:cNvPr id="1" name=""/>
+        <p:cNvGrpSpPr/>
+        <p:nvPr/>
+      </p:nvGrpSpPr>
+      <p:grpSpPr>
+        <a:xfrm>
+          <a:off x="0" y="0"/>
+          <a:ext cx="0" cy="0"/>
+          <a:chOff x="0" y="0"/>
+          <a:chExt cx="0" cy="0"/>
+        </a:xfrm>
+      </p:grpSpPr>
+      <p:sp>
+        <p:nvSpPr>
+          <p:cNvPr id="4" name="Rectangle 3">
+            <a:extLst>
+              <a:ext uri="{FF2B5EF4-FFF2-40B4-BE49-F238E27FC236}">
+                <a16:creationId xmlns:a16="http://schemas.microsoft.com/office/drawing/2014/main" id="{7D5A2426-9040-1848-88C7-44B07FA06239}"/>
+              </a:ext>
+            </a:extLst>
+          </p:cNvPr>
+          <p:cNvSpPr/>
+          <p:nvPr/>
+        </p:nvSpPr>
+        <p:spPr>
+          <a:xfrm>
+            <a:off x="171763" y="2160000"/>
+            <a:ext cx="3970745" cy="430887"/>
+          </a:xfrm>
+          <a:prstGeom prst="rect">
+            <a:avLst/>
+          </a:prstGeom>
+        </p:spPr>
+        <p:txBody>
+          <a:bodyPr wrap="square">
+            <a:spAutoFit/>
+          </a:bodyPr>
+          <a:lstStyle/>
+          <a:p>
+            <a:r>
+              <a:rPr lang="en-US" sz="1100" i="1" dirty="0">
+                <a:latin typeface="Cambria" panose="02040503050406030204" pitchFamily="18" charset="0"/>
+                <a:ea typeface="Cambria" panose="02040503050406030204" pitchFamily="18" charset="0"/>
+                <a:cs typeface="Times New Roman" panose="02020603050405020304" pitchFamily="18" charset="0"/>
+              </a:rPr>
+              <a:t>Figure 2. Boxplot of the scaled cube root of weight per generation and population. Phenotypic values have been scaled.</a:t>
+            </a:r>
+            <a:r>
+              <a:rPr lang="en-US" sz="1100" dirty="0">
+                <a:effectLst/>
+              </a:rPr>
+              <a:t> </a:t>
+            </a:r>
+            <a:endParaRPr lang="en-GB" sz="1100" dirty="0"/>
+          </a:p>
+        </p:txBody>
+      </p:sp>
+      <p:pic>
+        <p:nvPicPr>
+          <p:cNvPr id="3" name="Picture 2">
+            <a:extLst>
+              <a:ext uri="{FF2B5EF4-FFF2-40B4-BE49-F238E27FC236}">
+                <a16:creationId xmlns:a16="http://schemas.microsoft.com/office/drawing/2014/main" id="{DB45E770-010C-0B40-A51A-72F2D0C1B291}"/>
+              </a:ext>
+            </a:extLst>
+          </p:cNvPr>
+          <p:cNvPicPr>
+            <a:picLocks noChangeAspect="1"/>
+          </p:cNvPicPr>
+          <p:nvPr/>
+        </p:nvPicPr>
+        <p:blipFill>
+          <a:blip r:embed="rId2"/>
+          <a:stretch>
+            <a:fillRect/>
+          </a:stretch>
+        </p:blipFill>
+        <p:spPr>
+          <a:xfrm>
+            <a:off x="171764" y="0"/>
+            <a:ext cx="2700000" cy="2160000"/>
+          </a:xfrm>
+          <a:prstGeom prst="rect">
+            <a:avLst/>
+          </a:prstGeom>
+        </p:spPr>
+      </p:pic>
+      <p:sp>
+        <p:nvSpPr>
+          <p:cNvPr id="2" name="Rectangle 1">
+            <a:extLst>
+              <a:ext uri="{FF2B5EF4-FFF2-40B4-BE49-F238E27FC236}">
+                <a16:creationId xmlns:a16="http://schemas.microsoft.com/office/drawing/2014/main" id="{B07C1E85-AFD5-7C46-9AE6-4DABCD3ED7D0}"/>
+              </a:ext>
+            </a:extLst>
+          </p:cNvPr>
+          <p:cNvSpPr/>
+          <p:nvPr/>
+        </p:nvSpPr>
+        <p:spPr>
+          <a:xfrm>
+            <a:off x="6096000" y="305248"/>
+            <a:ext cx="6096000" cy="2177519"/>
+          </a:xfrm>
+          <a:prstGeom prst="rect">
+            <a:avLst/>
+          </a:prstGeom>
+        </p:spPr>
+        <p:txBody>
+          <a:bodyPr>
+            <a:spAutoFit/>
+          </a:bodyPr>
+          <a:lstStyle/>
+          <a:p>
+            <a:pPr>
+              <a:spcBef>
+                <a:spcPts val="800"/>
+              </a:spcBef>
+              <a:spcAft>
+                <a:spcPts val="0"/>
+              </a:spcAft>
+            </a:pPr>
+            <a:r>
+              <a:rPr lang="en-US" sz="1600" dirty="0">
+                <a:solidFill>
+                  <a:srgbClr val="000000"/>
+                </a:solidFill>
+                <a:latin typeface="Cambria" panose="02040503050406030204" pitchFamily="18" charset="0"/>
+                <a:ea typeface="Arial Unicode MS" panose="020B0604020202020204" pitchFamily="34" charset="-128"/>
+                <a:cs typeface="Arial Unicode MS" panose="020B0604020202020204" pitchFamily="34" charset="-128"/>
+              </a:rPr>
+              <a:t>Gen0 is the expected pattern. Gen1 is flat. This is a bit odd.</a:t>
+            </a:r>
+            <a:endParaRPr lang="en-US" sz="1600" dirty="0">
+              <a:solidFill>
+                <a:srgbClr val="000000"/>
+              </a:solidFill>
+              <a:latin typeface="Helvetica Neue" panose="02000503000000020004" pitchFamily="2" charset="0"/>
+              <a:ea typeface="Arial Unicode MS" panose="020B0604020202020204" pitchFamily="34" charset="-128"/>
+              <a:cs typeface="Arial Unicode MS" panose="020B0604020202020204" pitchFamily="34" charset="-128"/>
+            </a:endParaRPr>
+          </a:p>
+          <a:p>
+            <a:pPr>
+              <a:spcBef>
+                <a:spcPts val="900"/>
+              </a:spcBef>
+              <a:spcAft>
+                <a:spcPts val="900"/>
+              </a:spcAft>
+            </a:pPr>
+            <a:r>
+              <a:rPr lang="en-US" sz="1600" dirty="0">
+                <a:solidFill>
+                  <a:srgbClr val="000000"/>
+                </a:solidFill>
+                <a:uFill>
+                  <a:solidFill>
+                    <a:srgbClr val="000000"/>
+                  </a:solidFill>
+                </a:uFill>
+                <a:latin typeface="Cambria" panose="02040503050406030204" pitchFamily="18" charset="0"/>
+                <a:ea typeface="Arial Unicode MS" panose="020B0604020202020204" pitchFamily="34" charset="-128"/>
+                <a:cs typeface="Arial Unicode MS" panose="020B0604020202020204" pitchFamily="34" charset="-128"/>
+              </a:rPr>
+              <a:t>There are two obvious alternative explanations (not mutually exclusive): sampling was timed for when the size reached a certain point, or size is very plastic. We might separate these effects (partly) by correcting for sampling time (although larger snails were taken at each time point, I guess). Ultimately, this sampling time issue might make it hard to say anything about plasticity for size (or weight).</a:t>
+            </a:r>
+          </a:p>
+        </p:txBody>
+      </p:sp>
+      <p:pic>
+        <p:nvPicPr>
+          <p:cNvPr id="6" name="Picture 5">
+            <a:extLst>
+              <a:ext uri="{FF2B5EF4-FFF2-40B4-BE49-F238E27FC236}">
+                <a16:creationId xmlns:a16="http://schemas.microsoft.com/office/drawing/2014/main" id="{57B13244-33DD-944D-A610-3F6B8B18378D}"/>
+              </a:ext>
+            </a:extLst>
+          </p:cNvPr>
+          <p:cNvPicPr>
+            <a:picLocks noChangeAspect="1"/>
+          </p:cNvPicPr>
+          <p:nvPr/>
+        </p:nvPicPr>
+        <p:blipFill>
+          <a:blip r:embed="rId3"/>
+          <a:stretch>
+            <a:fillRect/>
+          </a:stretch>
+        </p:blipFill>
+        <p:spPr>
+          <a:xfrm>
+            <a:off x="696000" y="2538000"/>
+            <a:ext cx="5400000" cy="4320000"/>
+          </a:xfrm>
+          <a:prstGeom prst="rect">
+            <a:avLst/>
+          </a:prstGeom>
+        </p:spPr>
+      </p:pic>
+      <p:sp>
+        <p:nvSpPr>
+          <p:cNvPr id="7" name="Rectangle 6">
+            <a:extLst>
+              <a:ext uri="{FF2B5EF4-FFF2-40B4-BE49-F238E27FC236}">
+                <a16:creationId xmlns:a16="http://schemas.microsoft.com/office/drawing/2014/main" id="{F372BBF9-7A89-8A47-B663-C32BB14D9F4B}"/>
+              </a:ext>
+            </a:extLst>
+          </p:cNvPr>
+          <p:cNvSpPr/>
+          <p:nvPr/>
+        </p:nvSpPr>
+        <p:spPr>
+          <a:xfrm>
+            <a:off x="6096000" y="5419681"/>
+            <a:ext cx="6096000" cy="1323439"/>
+          </a:xfrm>
+          <a:prstGeom prst="rect">
+            <a:avLst/>
+          </a:prstGeom>
+        </p:spPr>
+        <p:txBody>
+          <a:bodyPr>
+            <a:spAutoFit/>
+          </a:bodyPr>
+          <a:lstStyle/>
+          <a:p>
+            <a:r>
+              <a:rPr lang="en-US" sz="1600" i="1" dirty="0">
+                <a:latin typeface="Times New Roman" panose="02020603050405020304" pitchFamily="18" charset="0"/>
+                <a:ea typeface="Arial Unicode MS" panose="020B0604020202020204" pitchFamily="34" charset="-128"/>
+              </a:rPr>
+              <a:t>Figure tmp2. Boxplot of the scaled cube root of weight per generation and population. Generation 1 was further divided into two groups (2 in orange was sampled in June and 3 in green was sampled in August; group </a:t>
+            </a:r>
+            <a:r>
+              <a:rPr lang="en-US" sz="1600" i="1">
+                <a:latin typeface="Times New Roman" panose="02020603050405020304" pitchFamily="18" charset="0"/>
+                <a:ea typeface="Arial Unicode MS" panose="020B0604020202020204" pitchFamily="34" charset="-128"/>
+              </a:rPr>
+              <a:t>x in violet </a:t>
+            </a:r>
+            <a:r>
+              <a:rPr lang="en-US" sz="1600" i="1" dirty="0">
+                <a:latin typeface="Times New Roman" panose="02020603050405020304" pitchFamily="18" charset="0"/>
+                <a:ea typeface="Arial Unicode MS" panose="020B0604020202020204" pitchFamily="34" charset="-128"/>
+              </a:rPr>
+              <a:t>is for unknown samples and contains only six individuals). Phenotypic values have been scaled.</a:t>
+            </a:r>
+            <a:r>
+              <a:rPr lang="en-US" sz="1600" dirty="0"/>
+              <a:t> </a:t>
+            </a:r>
+            <a:endParaRPr lang="en-GB" sz="1600" dirty="0"/>
+          </a:p>
+        </p:txBody>
+      </p:sp>
+    </p:spTree>
+    <p:extLst>
+      <p:ext uri="{BB962C8B-B14F-4D97-AF65-F5344CB8AC3E}">
+        <p14:creationId xmlns:p14="http://schemas.microsoft.com/office/powerpoint/2010/main" val="3957649804"/>
+      </p:ext>
+    </p:extLst>
+  </p:cSld>
+  <p:clrMapOvr>
+    <a:masterClrMapping/>
+  </p:clrMapOvr>
+</p:sld>
+</file>
+
+<file path=ppt/slides/slide6.xml><?xml version="1.0" encoding="utf-8"?>
 <p:sld xmlns:a="http://schemas.openxmlformats.org/drawingml/2006/main" xmlns:r="http://schemas.openxmlformats.org/officeDocument/2006/relationships" xmlns:p="http://schemas.openxmlformats.org/presentationml/2006/main">
   <p:cSld>
     <p:spTree>

</xml_diff>